<commit_message>
updated E R Diagram and final touch.
</commit_message>
<xml_diff>
--- a/report/ERD.pptx
+++ b/report/ERD.pptx
@@ -104,6 +104,11 @@
       </a:defRPr>
     </a:lvl9pPr>
   </p:defaultTextStyle>
+  <p:extLst>
+    <p:ext uri="{EFAFB233-063F-42B5-8137-9DF3F51BA10A}">
+      <p15:sldGuideLst xmlns:p15="http://schemas.microsoft.com/office/powerpoint/2012/main" xmlns=""/>
+    </p:ext>
+  </p:extLst>
 </p:presentation>
 </file>
 
@@ -2974,7 +2979,7 @@
         </p:nvSpPr>
         <p:spPr>
           <a:xfrm>
-            <a:off x="1490662" y="1200150"/>
+            <a:off x="1752599" y="1131093"/>
             <a:ext cx="723900" cy="295275"/>
           </a:xfrm>
           <a:prstGeom prst="rect">
@@ -3058,7 +3063,7 @@
         </p:nvSpPr>
         <p:spPr>
           <a:xfrm>
-            <a:off x="1423987" y="4479131"/>
+            <a:off x="6959599" y="4671608"/>
             <a:ext cx="857250" cy="295275"/>
           </a:xfrm>
           <a:prstGeom prst="rect">
@@ -3100,7 +3105,7 @@
         </p:nvSpPr>
         <p:spPr>
           <a:xfrm>
-            <a:off x="3028948" y="2690812"/>
+            <a:off x="2917945" y="2844598"/>
             <a:ext cx="2124075" cy="295275"/>
           </a:xfrm>
           <a:prstGeom prst="rect">
@@ -3142,7 +3147,7 @@
         </p:nvSpPr>
         <p:spPr>
           <a:xfrm>
-            <a:off x="6334125" y="4362449"/>
+            <a:off x="1512888" y="4819246"/>
             <a:ext cx="857250" cy="295275"/>
           </a:xfrm>
           <a:prstGeom prst="rect">
@@ -3184,7 +3189,7 @@
         </p:nvSpPr>
         <p:spPr>
           <a:xfrm>
-            <a:off x="3181348" y="1061442"/>
+            <a:off x="3181348" y="616942"/>
             <a:ext cx="1524000" cy="552450"/>
           </a:xfrm>
           <a:prstGeom prst="flowChartDecision">
@@ -3268,7 +3273,7 @@
         </p:nvSpPr>
         <p:spPr>
           <a:xfrm>
-            <a:off x="1343026" y="3257549"/>
+            <a:off x="418624" y="3739977"/>
             <a:ext cx="1714500" cy="552450"/>
           </a:xfrm>
           <a:prstGeom prst="flowChartDecision">
@@ -3310,8 +3315,8 @@
         </p:nvSpPr>
         <p:spPr>
           <a:xfrm>
-            <a:off x="5610225" y="3257549"/>
-            <a:ext cx="1800225" cy="552450"/>
+            <a:off x="2268538" y="4057362"/>
+            <a:ext cx="2191226" cy="552450"/>
           </a:xfrm>
           <a:prstGeom prst="flowChartDecision">
             <a:avLst/>
@@ -3338,7 +3343,7 @@
             <a:pPr algn="ctr"/>
             <a:r>
               <a:rPr lang="en-US" sz="1200" dirty="0" smtClean="0"/>
-              <a:t>Stores</a:t>
+              <a:t>Authenticates</a:t>
             </a:r>
             <a:endParaRPr lang="en-US" sz="1200" dirty="0"/>
           </a:p>
@@ -3583,7 +3588,7 @@
         </p:nvSpPr>
         <p:spPr>
           <a:xfrm>
-            <a:off x="1343025" y="180975"/>
+            <a:off x="938211" y="131878"/>
             <a:ext cx="1019175" cy="361950"/>
           </a:xfrm>
           <a:prstGeom prst="ellipse">
@@ -3709,8 +3714,8 @@
         </p:nvSpPr>
         <p:spPr>
           <a:xfrm>
-            <a:off x="209550" y="5303043"/>
-            <a:ext cx="647700" cy="361950"/>
+            <a:off x="5683249" y="5696743"/>
+            <a:ext cx="971707" cy="361950"/>
           </a:xfrm>
           <a:prstGeom prst="ellipse">
             <a:avLst/>
@@ -3736,10 +3741,10 @@
           <a:p>
             <a:pPr algn="ctr"/>
             <a:r>
-              <a:rPr lang="en-US" sz="1200" smtClean="0"/>
+              <a:rPr lang="en-US" sz="1200" u="sng" dirty="0" err="1" smtClean="0"/>
               <a:t>imageId</a:t>
             </a:r>
-            <a:endParaRPr lang="en-US" sz="1200"/>
+            <a:endParaRPr lang="en-US" sz="1200" u="sng" dirty="0"/>
           </a:p>
         </p:txBody>
       </p:sp>
@@ -3751,8 +3756,8 @@
         </p:nvSpPr>
         <p:spPr>
           <a:xfrm>
-            <a:off x="885824" y="5664993"/>
-            <a:ext cx="647700" cy="361950"/>
+            <a:off x="6341268" y="6158301"/>
+            <a:ext cx="966788" cy="361950"/>
           </a:xfrm>
           <a:prstGeom prst="ellipse">
             <a:avLst/>
@@ -3793,8 +3798,8 @@
         </p:nvSpPr>
         <p:spPr>
           <a:xfrm>
-            <a:off x="5153023" y="5138736"/>
-            <a:ext cx="647700" cy="361950"/>
+            <a:off x="439724" y="5584029"/>
+            <a:ext cx="924890" cy="361950"/>
           </a:xfrm>
           <a:prstGeom prst="ellipse">
             <a:avLst/>
@@ -3820,10 +3825,10 @@
           <a:p>
             <a:pPr algn="ctr"/>
             <a:r>
-              <a:rPr lang="en-US" sz="1200" dirty="0" err="1" smtClean="0"/>
+              <a:rPr lang="en-US" sz="1200" u="sng" dirty="0" err="1" smtClean="0"/>
               <a:t>UserId</a:t>
             </a:r>
-            <a:endParaRPr lang="en-US" sz="1200" dirty="0"/>
+            <a:endParaRPr lang="en-US" sz="1200" u="sng" dirty="0"/>
           </a:p>
         </p:txBody>
       </p:sp>
@@ -3835,7 +3840,7 @@
         </p:nvSpPr>
         <p:spPr>
           <a:xfrm>
-            <a:off x="1919287" y="5605461"/>
+            <a:off x="7392987" y="5999161"/>
             <a:ext cx="647700" cy="361950"/>
           </a:xfrm>
           <a:prstGeom prst="ellipse">
@@ -3877,8 +3882,8 @@
         </p:nvSpPr>
         <p:spPr>
           <a:xfrm>
-            <a:off x="6762750" y="5905497"/>
-            <a:ext cx="647700" cy="361950"/>
+            <a:off x="2490786" y="5484018"/>
+            <a:ext cx="963613" cy="361950"/>
           </a:xfrm>
           <a:prstGeom prst="ellipse">
             <a:avLst/>
@@ -3919,8 +3924,8 @@
         </p:nvSpPr>
         <p:spPr>
           <a:xfrm>
-            <a:off x="2533648" y="5233986"/>
-            <a:ext cx="647700" cy="361950"/>
+            <a:off x="8007348" y="5627686"/>
+            <a:ext cx="831852" cy="361950"/>
           </a:xfrm>
           <a:prstGeom prst="ellipse">
             <a:avLst/>
@@ -3961,8 +3966,8 @@
         </p:nvSpPr>
         <p:spPr>
           <a:xfrm>
-            <a:off x="5838825" y="5765004"/>
-            <a:ext cx="647700" cy="361950"/>
+            <a:off x="1552576" y="5845968"/>
+            <a:ext cx="938210" cy="361950"/>
           </a:xfrm>
           <a:prstGeom prst="ellipse">
             <a:avLst/>
@@ -4000,14 +4005,14 @@
           <p:cNvPr id="55" name="Straight Arrow Connector 54"/>
           <p:cNvCxnSpPr>
             <a:stCxn id="19" idx="4"/>
-            <a:endCxn id="4" idx="0"/>
+            <a:endCxn id="4" idx="1"/>
           </p:cNvCxnSpPr>
           <p:nvPr/>
         </p:nvCxnSpPr>
         <p:spPr>
-          <a:xfrm flipH="1">
-            <a:off x="1852612" y="542925"/>
-            <a:ext cx="1" cy="657225"/>
+          <a:xfrm>
+            <a:off x="1447799" y="493828"/>
+            <a:ext cx="304800" cy="784903"/>
           </a:xfrm>
           <a:prstGeom prst="straightConnector1">
             <a:avLst/>
@@ -4036,14 +4041,14 @@
           <p:cNvPr id="56" name="Straight Arrow Connector 55"/>
           <p:cNvCxnSpPr>
             <a:stCxn id="14" idx="6"/>
-            <a:endCxn id="4" idx="0"/>
+            <a:endCxn id="4" idx="1"/>
           </p:cNvCxnSpPr>
           <p:nvPr/>
         </p:nvCxnSpPr>
         <p:spPr>
           <a:xfrm>
             <a:off x="1209674" y="723900"/>
-            <a:ext cx="642938" cy="476250"/>
+            <a:ext cx="542925" cy="554831"/>
           </a:xfrm>
           <a:prstGeom prst="straightConnector1">
             <a:avLst/>
@@ -4079,7 +4084,7 @@
         <p:spPr>
           <a:xfrm>
             <a:off x="914399" y="1278731"/>
-            <a:ext cx="576263" cy="69057"/>
+            <a:ext cx="838200" cy="0"/>
           </a:xfrm>
           <a:prstGeom prst="straightConnector1">
             <a:avLst/>
@@ -4114,8 +4119,8 @@
         </p:nvCxnSpPr>
         <p:spPr>
           <a:xfrm flipV="1">
-            <a:off x="1087424" y="1347788"/>
-            <a:ext cx="403238" cy="467915"/>
+            <a:off x="1087424" y="1278731"/>
+            <a:ext cx="665175" cy="536972"/>
           </a:xfrm>
           <a:prstGeom prst="straightConnector1">
             <a:avLst/>
@@ -4150,8 +4155,8 @@
         </p:nvCxnSpPr>
         <p:spPr>
           <a:xfrm flipV="1">
-            <a:off x="1181257" y="1347788"/>
-            <a:ext cx="309405" cy="876917"/>
+            <a:off x="1181257" y="1278731"/>
+            <a:ext cx="571342" cy="945974"/>
           </a:xfrm>
           <a:prstGeom prst="straightConnector1">
             <a:avLst/>
@@ -4291,7 +4296,7 @@
         </p:nvSpPr>
         <p:spPr>
           <a:xfrm>
-            <a:off x="3233735" y="3352799"/>
+            <a:off x="5180134" y="3691730"/>
             <a:ext cx="1714500" cy="552450"/>
           </a:xfrm>
           <a:prstGeom prst="flowChartDecision">
@@ -4325,6 +4330,771 @@
           </a:p>
         </p:txBody>
       </p:sp>
+      <p:cxnSp>
+        <p:nvCxnSpPr>
+          <p:cNvPr id="3" name="Elbow Connector 2"/>
+          <p:cNvCxnSpPr>
+            <a:stCxn id="4" idx="0"/>
+            <a:endCxn id="10" idx="1"/>
+          </p:cNvCxnSpPr>
+          <p:nvPr/>
+        </p:nvCxnSpPr>
+        <p:spPr>
+          <a:xfrm rot="5400000" flipH="1" flipV="1">
+            <a:off x="2528985" y="478731"/>
+            <a:ext cx="237926" cy="1066799"/>
+          </a:xfrm>
+          <a:prstGeom prst="bentConnector2">
+            <a:avLst/>
+          </a:prstGeom>
+          <a:ln>
+            <a:tailEnd type="triangle"/>
+          </a:ln>
+        </p:spPr>
+        <p:style>
+          <a:lnRef idx="1">
+            <a:schemeClr val="dk1"/>
+          </a:lnRef>
+          <a:fillRef idx="0">
+            <a:schemeClr val="dk1"/>
+          </a:fillRef>
+          <a:effectRef idx="0">
+            <a:schemeClr val="dk1"/>
+          </a:effectRef>
+          <a:fontRef idx="minor">
+            <a:schemeClr val="tx1"/>
+          </a:fontRef>
+        </p:style>
+      </p:cxnSp>
+      <p:cxnSp>
+        <p:nvCxnSpPr>
+          <p:cNvPr id="26" name="Elbow Connector 25"/>
+          <p:cNvCxnSpPr>
+            <a:stCxn id="10" idx="3"/>
+            <a:endCxn id="5" idx="1"/>
+          </p:cNvCxnSpPr>
+          <p:nvPr/>
+        </p:nvCxnSpPr>
+        <p:spPr>
+          <a:xfrm>
+            <a:off x="4705348" y="893167"/>
+            <a:ext cx="1262064" cy="444501"/>
+          </a:xfrm>
+          <a:prstGeom prst="bentConnector3">
+            <a:avLst/>
+          </a:prstGeom>
+          <a:ln>
+            <a:tailEnd type="triangle"/>
+          </a:ln>
+        </p:spPr>
+        <p:style>
+          <a:lnRef idx="1">
+            <a:schemeClr val="dk1"/>
+          </a:lnRef>
+          <a:fillRef idx="0">
+            <a:schemeClr val="dk1"/>
+          </a:fillRef>
+          <a:effectRef idx="0">
+            <a:schemeClr val="dk1"/>
+          </a:effectRef>
+          <a:fontRef idx="minor">
+            <a:schemeClr val="tx1"/>
+          </a:fontRef>
+        </p:style>
+      </p:cxnSp>
+      <p:cxnSp>
+        <p:nvCxnSpPr>
+          <p:cNvPr id="31" name="Elbow Connector 30"/>
+          <p:cNvCxnSpPr>
+            <a:stCxn id="5" idx="2"/>
+            <a:endCxn id="11" idx="0"/>
+          </p:cNvCxnSpPr>
+          <p:nvPr/>
+        </p:nvCxnSpPr>
+        <p:spPr>
+          <a:xfrm rot="16200000" flipH="1">
+            <a:off x="6038552" y="1842789"/>
+            <a:ext cx="719732" cy="4763"/>
+          </a:xfrm>
+          <a:prstGeom prst="bentConnector3">
+            <a:avLst/>
+          </a:prstGeom>
+          <a:ln>
+            <a:tailEnd type="triangle"/>
+          </a:ln>
+        </p:spPr>
+        <p:style>
+          <a:lnRef idx="1">
+            <a:schemeClr val="dk1"/>
+          </a:lnRef>
+          <a:fillRef idx="0">
+            <a:schemeClr val="dk1"/>
+          </a:fillRef>
+          <a:effectRef idx="0">
+            <a:schemeClr val="dk1"/>
+          </a:effectRef>
+          <a:fontRef idx="minor">
+            <a:schemeClr val="tx1"/>
+          </a:fontRef>
+        </p:style>
+      </p:cxnSp>
+      <p:cxnSp>
+        <p:nvCxnSpPr>
+          <p:cNvPr id="33" name="Straight Arrow Connector 32"/>
+          <p:cNvCxnSpPr>
+            <a:stCxn id="22" idx="0"/>
+            <a:endCxn id="6" idx="2"/>
+          </p:cNvCxnSpPr>
+          <p:nvPr/>
+        </p:nvCxnSpPr>
+        <p:spPr>
+          <a:xfrm flipV="1">
+            <a:off x="6169103" y="4966883"/>
+            <a:ext cx="1219121" cy="729860"/>
+          </a:xfrm>
+          <a:prstGeom prst="straightConnector1">
+            <a:avLst/>
+          </a:prstGeom>
+          <a:ln>
+            <a:tailEnd type="triangle"/>
+          </a:ln>
+        </p:spPr>
+        <p:style>
+          <a:lnRef idx="1">
+            <a:schemeClr val="dk1"/>
+          </a:lnRef>
+          <a:fillRef idx="0">
+            <a:schemeClr val="dk1"/>
+          </a:fillRef>
+          <a:effectRef idx="0">
+            <a:schemeClr val="dk1"/>
+          </a:effectRef>
+          <a:fontRef idx="minor">
+            <a:schemeClr val="tx1"/>
+          </a:fontRef>
+        </p:style>
+      </p:cxnSp>
+      <p:cxnSp>
+        <p:nvCxnSpPr>
+          <p:cNvPr id="35" name="Straight Arrow Connector 34"/>
+          <p:cNvCxnSpPr>
+            <a:stCxn id="23" idx="0"/>
+            <a:endCxn id="6" idx="2"/>
+          </p:cNvCxnSpPr>
+          <p:nvPr/>
+        </p:nvCxnSpPr>
+        <p:spPr>
+          <a:xfrm flipV="1">
+            <a:off x="6824662" y="4966883"/>
+            <a:ext cx="563562" cy="1191418"/>
+          </a:xfrm>
+          <a:prstGeom prst="straightConnector1">
+            <a:avLst/>
+          </a:prstGeom>
+          <a:ln>
+            <a:tailEnd type="triangle"/>
+          </a:ln>
+        </p:spPr>
+        <p:style>
+          <a:lnRef idx="1">
+            <a:schemeClr val="dk1"/>
+          </a:lnRef>
+          <a:fillRef idx="0">
+            <a:schemeClr val="dk1"/>
+          </a:fillRef>
+          <a:effectRef idx="0">
+            <a:schemeClr val="dk1"/>
+          </a:effectRef>
+          <a:fontRef idx="minor">
+            <a:schemeClr val="tx1"/>
+          </a:fontRef>
+        </p:style>
+      </p:cxnSp>
+      <p:cxnSp>
+        <p:nvCxnSpPr>
+          <p:cNvPr id="37" name="Straight Arrow Connector 36"/>
+          <p:cNvCxnSpPr>
+            <a:stCxn id="25" idx="0"/>
+            <a:endCxn id="6" idx="2"/>
+          </p:cNvCxnSpPr>
+          <p:nvPr/>
+        </p:nvCxnSpPr>
+        <p:spPr>
+          <a:xfrm flipH="1" flipV="1">
+            <a:off x="7388224" y="4966883"/>
+            <a:ext cx="328613" cy="1032278"/>
+          </a:xfrm>
+          <a:prstGeom prst="straightConnector1">
+            <a:avLst/>
+          </a:prstGeom>
+          <a:ln>
+            <a:tailEnd type="triangle"/>
+          </a:ln>
+        </p:spPr>
+        <p:style>
+          <a:lnRef idx="1">
+            <a:schemeClr val="dk1"/>
+          </a:lnRef>
+          <a:fillRef idx="0">
+            <a:schemeClr val="dk1"/>
+          </a:fillRef>
+          <a:effectRef idx="0">
+            <a:schemeClr val="dk1"/>
+          </a:effectRef>
+          <a:fontRef idx="minor">
+            <a:schemeClr val="tx1"/>
+          </a:fontRef>
+        </p:style>
+      </p:cxnSp>
+      <p:cxnSp>
+        <p:nvCxnSpPr>
+          <p:cNvPr id="39" name="Straight Arrow Connector 38"/>
+          <p:cNvCxnSpPr>
+            <a:stCxn id="28" idx="0"/>
+            <a:endCxn id="6" idx="2"/>
+          </p:cNvCxnSpPr>
+          <p:nvPr/>
+        </p:nvCxnSpPr>
+        <p:spPr>
+          <a:xfrm flipH="1" flipV="1">
+            <a:off x="7388224" y="4966883"/>
+            <a:ext cx="1035050" cy="660803"/>
+          </a:xfrm>
+          <a:prstGeom prst="straightConnector1">
+            <a:avLst/>
+          </a:prstGeom>
+          <a:ln>
+            <a:tailEnd type="triangle"/>
+          </a:ln>
+        </p:spPr>
+        <p:style>
+          <a:lnRef idx="1">
+            <a:schemeClr val="dk1"/>
+          </a:lnRef>
+          <a:fillRef idx="0">
+            <a:schemeClr val="dk1"/>
+          </a:fillRef>
+          <a:effectRef idx="0">
+            <a:schemeClr val="dk1"/>
+          </a:effectRef>
+          <a:fontRef idx="minor">
+            <a:schemeClr val="tx1"/>
+          </a:fontRef>
+        </p:style>
+      </p:cxnSp>
+      <p:cxnSp>
+        <p:nvCxnSpPr>
+          <p:cNvPr id="59" name="Elbow Connector 58"/>
+          <p:cNvCxnSpPr>
+            <a:stCxn id="11" idx="2"/>
+            <a:endCxn id="6" idx="0"/>
+          </p:cNvCxnSpPr>
+          <p:nvPr/>
+        </p:nvCxnSpPr>
+        <p:spPr>
+          <a:xfrm rot="16200000" flipH="1">
+            <a:off x="5937452" y="3220835"/>
+            <a:ext cx="1914121" cy="987424"/>
+          </a:xfrm>
+          <a:prstGeom prst="bentConnector3">
+            <a:avLst/>
+          </a:prstGeom>
+          <a:ln>
+            <a:tailEnd type="triangle"/>
+          </a:ln>
+        </p:spPr>
+        <p:style>
+          <a:lnRef idx="1">
+            <a:schemeClr val="dk1"/>
+          </a:lnRef>
+          <a:fillRef idx="0">
+            <a:schemeClr val="dk1"/>
+          </a:fillRef>
+          <a:effectRef idx="0">
+            <a:schemeClr val="dk1"/>
+          </a:effectRef>
+          <a:fontRef idx="minor">
+            <a:schemeClr val="tx1"/>
+          </a:fontRef>
+        </p:style>
+      </p:cxnSp>
+      <p:cxnSp>
+        <p:nvCxnSpPr>
+          <p:cNvPr id="65" name="Straight Arrow Connector 64"/>
+          <p:cNvCxnSpPr>
+            <a:stCxn id="29" idx="0"/>
+            <a:endCxn id="9" idx="2"/>
+          </p:cNvCxnSpPr>
+          <p:nvPr/>
+        </p:nvCxnSpPr>
+        <p:spPr>
+          <a:xfrm flipH="1" flipV="1">
+            <a:off x="1941513" y="5114521"/>
+            <a:ext cx="80168" cy="731447"/>
+          </a:xfrm>
+          <a:prstGeom prst="straightConnector1">
+            <a:avLst/>
+          </a:prstGeom>
+          <a:ln>
+            <a:tailEnd type="triangle"/>
+          </a:ln>
+        </p:spPr>
+        <p:style>
+          <a:lnRef idx="1">
+            <a:schemeClr val="dk1"/>
+          </a:lnRef>
+          <a:fillRef idx="0">
+            <a:schemeClr val="dk1"/>
+          </a:fillRef>
+          <a:effectRef idx="0">
+            <a:schemeClr val="dk1"/>
+          </a:effectRef>
+          <a:fontRef idx="minor">
+            <a:schemeClr val="tx1"/>
+          </a:fontRef>
+        </p:style>
+      </p:cxnSp>
+      <p:cxnSp>
+        <p:nvCxnSpPr>
+          <p:cNvPr id="69" name="Straight Arrow Connector 68"/>
+          <p:cNvCxnSpPr>
+            <a:stCxn id="24" idx="0"/>
+            <a:endCxn id="9" idx="2"/>
+          </p:cNvCxnSpPr>
+          <p:nvPr/>
+        </p:nvCxnSpPr>
+        <p:spPr>
+          <a:xfrm flipV="1">
+            <a:off x="902169" y="5114521"/>
+            <a:ext cx="1039344" cy="469508"/>
+          </a:xfrm>
+          <a:prstGeom prst="straightConnector1">
+            <a:avLst/>
+          </a:prstGeom>
+          <a:ln>
+            <a:tailEnd type="triangle"/>
+          </a:ln>
+        </p:spPr>
+        <p:style>
+          <a:lnRef idx="1">
+            <a:schemeClr val="dk1"/>
+          </a:lnRef>
+          <a:fillRef idx="0">
+            <a:schemeClr val="dk1"/>
+          </a:fillRef>
+          <a:effectRef idx="0">
+            <a:schemeClr val="dk1"/>
+          </a:effectRef>
+          <a:fontRef idx="minor">
+            <a:schemeClr val="tx1"/>
+          </a:fontRef>
+        </p:style>
+      </p:cxnSp>
+      <p:cxnSp>
+        <p:nvCxnSpPr>
+          <p:cNvPr id="72" name="Straight Arrow Connector 71"/>
+          <p:cNvCxnSpPr>
+            <a:stCxn id="27" idx="0"/>
+            <a:endCxn id="9" idx="2"/>
+          </p:cNvCxnSpPr>
+          <p:nvPr/>
+        </p:nvCxnSpPr>
+        <p:spPr>
+          <a:xfrm flipH="1" flipV="1">
+            <a:off x="1941513" y="5114521"/>
+            <a:ext cx="1031080" cy="369497"/>
+          </a:xfrm>
+          <a:prstGeom prst="straightConnector1">
+            <a:avLst/>
+          </a:prstGeom>
+          <a:ln>
+            <a:tailEnd type="triangle"/>
+          </a:ln>
+        </p:spPr>
+        <p:style>
+          <a:lnRef idx="1">
+            <a:schemeClr val="dk1"/>
+          </a:lnRef>
+          <a:fillRef idx="0">
+            <a:schemeClr val="dk1"/>
+          </a:fillRef>
+          <a:effectRef idx="0">
+            <a:schemeClr val="dk1"/>
+          </a:effectRef>
+          <a:fontRef idx="minor">
+            <a:schemeClr val="tx1"/>
+          </a:fontRef>
+        </p:style>
+      </p:cxnSp>
+      <p:cxnSp>
+        <p:nvCxnSpPr>
+          <p:cNvPr id="75" name="Elbow Connector 74"/>
+          <p:cNvCxnSpPr>
+            <a:stCxn id="9" idx="0"/>
+            <a:endCxn id="12" idx="2"/>
+          </p:cNvCxnSpPr>
+          <p:nvPr/>
+        </p:nvCxnSpPr>
+        <p:spPr>
+          <a:xfrm rot="16200000" flipV="1">
+            <a:off x="1345285" y="4223017"/>
+            <a:ext cx="526819" cy="665639"/>
+          </a:xfrm>
+          <a:prstGeom prst="bentConnector3">
+            <a:avLst/>
+          </a:prstGeom>
+          <a:ln>
+            <a:tailEnd type="triangle"/>
+          </a:ln>
+        </p:spPr>
+        <p:style>
+          <a:lnRef idx="1">
+            <a:schemeClr val="dk1"/>
+          </a:lnRef>
+          <a:fillRef idx="0">
+            <a:schemeClr val="dk1"/>
+          </a:fillRef>
+          <a:effectRef idx="0">
+            <a:schemeClr val="dk1"/>
+          </a:effectRef>
+          <a:fontRef idx="minor">
+            <a:schemeClr val="tx1"/>
+          </a:fontRef>
+        </p:style>
+      </p:cxnSp>
+      <p:cxnSp>
+        <p:nvCxnSpPr>
+          <p:cNvPr id="77" name="Elbow Connector 76"/>
+          <p:cNvCxnSpPr>
+            <a:stCxn id="12" idx="0"/>
+            <a:endCxn id="4" idx="2"/>
+          </p:cNvCxnSpPr>
+          <p:nvPr/>
+        </p:nvCxnSpPr>
+        <p:spPr>
+          <a:xfrm rot="5400000" flipH="1" flipV="1">
+            <a:off x="538407" y="2163836"/>
+            <a:ext cx="2313609" cy="838675"/>
+          </a:xfrm>
+          <a:prstGeom prst="bentConnector3">
+            <a:avLst/>
+          </a:prstGeom>
+          <a:ln>
+            <a:tailEnd type="triangle"/>
+          </a:ln>
+        </p:spPr>
+        <p:style>
+          <a:lnRef idx="1">
+            <a:schemeClr val="dk1"/>
+          </a:lnRef>
+          <a:fillRef idx="0">
+            <a:schemeClr val="dk1"/>
+          </a:fillRef>
+          <a:effectRef idx="0">
+            <a:schemeClr val="dk1"/>
+          </a:effectRef>
+          <a:fontRef idx="minor">
+            <a:schemeClr val="tx1"/>
+          </a:fontRef>
+        </p:style>
+      </p:cxnSp>
+      <p:cxnSp>
+        <p:nvCxnSpPr>
+          <p:cNvPr id="79" name="Elbow Connector 78"/>
+          <p:cNvCxnSpPr>
+            <a:stCxn id="8" idx="1"/>
+            <a:endCxn id="13" idx="0"/>
+          </p:cNvCxnSpPr>
+          <p:nvPr/>
+        </p:nvCxnSpPr>
+        <p:spPr>
+          <a:xfrm rot="10800000" flipH="1" flipV="1">
+            <a:off x="2917945" y="2992236"/>
+            <a:ext cx="446206" cy="1065126"/>
+          </a:xfrm>
+          <a:prstGeom prst="bentConnector4">
+            <a:avLst>
+              <a:gd name="adj1" fmla="val -51232"/>
+              <a:gd name="adj2" fmla="val 56930"/>
+            </a:avLst>
+          </a:prstGeom>
+          <a:ln>
+            <a:tailEnd type="triangle"/>
+          </a:ln>
+        </p:spPr>
+        <p:style>
+          <a:lnRef idx="1">
+            <a:schemeClr val="dk1"/>
+          </a:lnRef>
+          <a:fillRef idx="0">
+            <a:schemeClr val="dk1"/>
+          </a:fillRef>
+          <a:effectRef idx="0">
+            <a:schemeClr val="dk1"/>
+          </a:effectRef>
+          <a:fontRef idx="minor">
+            <a:schemeClr val="tx1"/>
+          </a:fontRef>
+        </p:style>
+      </p:cxnSp>
+      <p:cxnSp>
+        <p:nvCxnSpPr>
+          <p:cNvPr id="81" name="Elbow Connector 80"/>
+          <p:cNvCxnSpPr>
+            <a:stCxn id="13" idx="2"/>
+            <a:endCxn id="9" idx="3"/>
+          </p:cNvCxnSpPr>
+          <p:nvPr/>
+        </p:nvCxnSpPr>
+        <p:spPr>
+          <a:xfrm rot="5400000">
+            <a:off x="2688609" y="4291342"/>
+            <a:ext cx="357072" cy="994013"/>
+          </a:xfrm>
+          <a:prstGeom prst="bentConnector2">
+            <a:avLst/>
+          </a:prstGeom>
+          <a:ln>
+            <a:tailEnd type="triangle"/>
+          </a:ln>
+        </p:spPr>
+        <p:style>
+          <a:lnRef idx="1">
+            <a:schemeClr val="dk1"/>
+          </a:lnRef>
+          <a:fillRef idx="0">
+            <a:schemeClr val="dk1"/>
+          </a:fillRef>
+          <a:effectRef idx="0">
+            <a:schemeClr val="dk1"/>
+          </a:effectRef>
+          <a:fontRef idx="minor">
+            <a:schemeClr val="tx1"/>
+          </a:fontRef>
+        </p:style>
+      </p:cxnSp>
+      <p:sp>
+        <p:nvSpPr>
+          <p:cNvPr id="83" name="Flowchart: Decision 82"/>
+          <p:cNvSpPr/>
+          <p:nvPr/>
+        </p:nvSpPr>
+        <p:spPr>
+          <a:xfrm>
+            <a:off x="3217982" y="1672255"/>
+            <a:ext cx="1524000" cy="552450"/>
+          </a:xfrm>
+          <a:prstGeom prst="flowChartDecision">
+            <a:avLst/>
+          </a:prstGeom>
+        </p:spPr>
+        <p:style>
+          <a:lnRef idx="2">
+            <a:schemeClr val="dk1"/>
+          </a:lnRef>
+          <a:fillRef idx="1">
+            <a:schemeClr val="lt1"/>
+          </a:fillRef>
+          <a:effectRef idx="0">
+            <a:schemeClr val="dk1"/>
+          </a:effectRef>
+          <a:fontRef idx="minor">
+            <a:schemeClr val="dk1"/>
+          </a:fontRef>
+        </p:style>
+        <p:txBody>
+          <a:bodyPr rtlCol="0" anchor="ctr"/>
+          <a:lstStyle/>
+          <a:p>
+            <a:pPr algn="ctr"/>
+            <a:r>
+              <a:rPr lang="en-US" sz="1200" dirty="0" smtClean="0"/>
+              <a:t>Takes Image</a:t>
+            </a:r>
+            <a:endParaRPr lang="en-US" sz="1200" dirty="0"/>
+          </a:p>
+        </p:txBody>
+      </p:sp>
+      <p:cxnSp>
+        <p:nvCxnSpPr>
+          <p:cNvPr id="85" name="Elbow Connector 84"/>
+          <p:cNvCxnSpPr>
+            <a:stCxn id="4" idx="3"/>
+            <a:endCxn id="83" idx="1"/>
+          </p:cNvCxnSpPr>
+          <p:nvPr/>
+        </p:nvCxnSpPr>
+        <p:spPr>
+          <a:xfrm>
+            <a:off x="2476499" y="1278731"/>
+            <a:ext cx="741483" cy="669749"/>
+          </a:xfrm>
+          <a:prstGeom prst="bentConnector3">
+            <a:avLst/>
+          </a:prstGeom>
+          <a:ln>
+            <a:tailEnd type="triangle"/>
+          </a:ln>
+        </p:spPr>
+        <p:style>
+          <a:lnRef idx="1">
+            <a:schemeClr val="dk1"/>
+          </a:lnRef>
+          <a:fillRef idx="0">
+            <a:schemeClr val="dk1"/>
+          </a:fillRef>
+          <a:effectRef idx="0">
+            <a:schemeClr val="dk1"/>
+          </a:effectRef>
+          <a:fontRef idx="minor">
+            <a:schemeClr val="tx1"/>
+          </a:fontRef>
+        </p:style>
+      </p:cxnSp>
+      <p:cxnSp>
+        <p:nvCxnSpPr>
+          <p:cNvPr id="87" name="Elbow Connector 86"/>
+          <p:cNvCxnSpPr>
+            <a:stCxn id="83" idx="2"/>
+            <a:endCxn id="8" idx="0"/>
+          </p:cNvCxnSpPr>
+          <p:nvPr/>
+        </p:nvCxnSpPr>
+        <p:spPr>
+          <a:xfrm rot="16200000" flipH="1">
+            <a:off x="3670036" y="2534650"/>
+            <a:ext cx="619893" cy="1"/>
+          </a:xfrm>
+          <a:prstGeom prst="bentConnector3">
+            <a:avLst/>
+          </a:prstGeom>
+          <a:ln>
+            <a:tailEnd type="triangle"/>
+          </a:ln>
+        </p:spPr>
+        <p:style>
+          <a:lnRef idx="1">
+            <a:schemeClr val="dk1"/>
+          </a:lnRef>
+          <a:fillRef idx="0">
+            <a:schemeClr val="dk1"/>
+          </a:fillRef>
+          <a:effectRef idx="0">
+            <a:schemeClr val="dk1"/>
+          </a:effectRef>
+          <a:fontRef idx="minor">
+            <a:schemeClr val="tx1"/>
+          </a:fontRef>
+        </p:style>
+      </p:cxnSp>
+      <p:cxnSp>
+        <p:nvCxnSpPr>
+          <p:cNvPr id="95" name="Elbow Connector 94"/>
+          <p:cNvCxnSpPr>
+            <a:stCxn id="8" idx="3"/>
+            <a:endCxn id="73" idx="0"/>
+          </p:cNvCxnSpPr>
+          <p:nvPr/>
+        </p:nvCxnSpPr>
+        <p:spPr>
+          <a:xfrm>
+            <a:off x="5042020" y="2992236"/>
+            <a:ext cx="995364" cy="699494"/>
+          </a:xfrm>
+          <a:prstGeom prst="bentConnector2">
+            <a:avLst/>
+          </a:prstGeom>
+          <a:ln>
+            <a:tailEnd type="triangle"/>
+          </a:ln>
+        </p:spPr>
+        <p:style>
+          <a:lnRef idx="1">
+            <a:schemeClr val="dk1"/>
+          </a:lnRef>
+          <a:fillRef idx="0">
+            <a:schemeClr val="dk1"/>
+          </a:fillRef>
+          <a:effectRef idx="0">
+            <a:schemeClr val="dk1"/>
+          </a:effectRef>
+          <a:fontRef idx="minor">
+            <a:schemeClr val="tx1"/>
+          </a:fontRef>
+        </p:style>
+      </p:cxnSp>
+      <p:cxnSp>
+        <p:nvCxnSpPr>
+          <p:cNvPr id="97" name="Elbow Connector 96"/>
+          <p:cNvCxnSpPr>
+            <a:stCxn id="6" idx="1"/>
+            <a:endCxn id="73" idx="2"/>
+          </p:cNvCxnSpPr>
+          <p:nvPr/>
+        </p:nvCxnSpPr>
+        <p:spPr>
+          <a:xfrm rot="10800000">
+            <a:off x="6037385" y="4244180"/>
+            <a:ext cx="922215" cy="575066"/>
+          </a:xfrm>
+          <a:prstGeom prst="bentConnector2">
+            <a:avLst/>
+          </a:prstGeom>
+          <a:ln>
+            <a:tailEnd type="triangle"/>
+          </a:ln>
+        </p:spPr>
+        <p:style>
+          <a:lnRef idx="1">
+            <a:schemeClr val="dk1"/>
+          </a:lnRef>
+          <a:fillRef idx="0">
+            <a:schemeClr val="dk1"/>
+          </a:fillRef>
+          <a:effectRef idx="0">
+            <a:schemeClr val="dk1"/>
+          </a:effectRef>
+          <a:fontRef idx="minor">
+            <a:schemeClr val="tx1"/>
+          </a:fontRef>
+        </p:style>
+      </p:cxnSp>
+      <p:cxnSp>
+        <p:nvCxnSpPr>
+          <p:cNvPr id="104" name="Elbow Connector 103"/>
+          <p:cNvCxnSpPr>
+            <a:stCxn id="73" idx="1"/>
+            <a:endCxn id="8" idx="2"/>
+          </p:cNvCxnSpPr>
+          <p:nvPr/>
+        </p:nvCxnSpPr>
+        <p:spPr>
+          <a:xfrm rot="10800000">
+            <a:off x="3979984" y="3139873"/>
+            <a:ext cx="1200151" cy="828082"/>
+          </a:xfrm>
+          <a:prstGeom prst="bentConnector2">
+            <a:avLst/>
+          </a:prstGeom>
+          <a:ln>
+            <a:tailEnd type="triangle"/>
+          </a:ln>
+        </p:spPr>
+        <p:style>
+          <a:lnRef idx="1">
+            <a:schemeClr val="dk1"/>
+          </a:lnRef>
+          <a:fillRef idx="0">
+            <a:schemeClr val="dk1"/>
+          </a:fillRef>
+          <a:effectRef idx="0">
+            <a:schemeClr val="dk1"/>
+          </a:effectRef>
+          <a:fontRef idx="minor">
+            <a:schemeClr val="tx1"/>
+          </a:fontRef>
+        </p:style>
+      </p:cxnSp>
     </p:spTree>
     <p:extLst>
       <p:ext uri="{BB962C8B-B14F-4D97-AF65-F5344CB8AC3E}">
@@ -4388,7 +5158,7 @@
     </a:clrScheme>
     <a:fontScheme name="Office Theme">
       <a:majorFont>
-        <a:latin typeface="Calibri Light" panose="020F0302020204030204"/>
+        <a:latin typeface="Calibri Light"/>
         <a:ea typeface=""/>
         <a:cs typeface=""/>
         <a:font script="Jpan" typeface="ＭＳ Ｐゴシック"/>
@@ -4423,7 +5193,7 @@
         <a:font script="Geor" typeface="Sylfaen"/>
       </a:majorFont>
       <a:minorFont>
-        <a:latin typeface="Calibri" panose="020F0502020204030204"/>
+        <a:latin typeface="Calibri"/>
         <a:ea typeface=""/>
         <a:cs typeface=""/>
         <a:font script="Jpan" typeface="ＭＳ Ｐゴシック"/>
@@ -4600,7 +5370,7 @@
   <a:extraClrSchemeLst/>
   <a:extLst>
     <a:ext uri="{05A4C25C-085E-4340-85A3-A5531E510DB2}">
-      <thm15:themeFamily xmlns:thm15="http://schemas.microsoft.com/office/thememl/2012/main" name="Office Theme" id="{62F939B6-93AF-4DB8-9C6B-D6C7DFDC589F}" vid="{4A3C46E8-61CC-4603-A589-7422A47A8E4A}"/>
+      <thm15:themeFamily xmlns:thm15="http://schemas.microsoft.com/office/thememl/2012/main" xmlns="" name="Office Theme" id="{62F939B6-93AF-4DB8-9C6B-D6C7DFDC589F}" vid="{4A3C46E8-61CC-4603-A589-7422A47A8E4A}"/>
     </a:ext>
   </a:extLst>
 </a:theme>

</xml_diff>